<commit_message>
Reviewing Links and confirming folder names
</commit_message>
<xml_diff>
--- a/Slides/Slides-05-The_Validation_Report/Slides-05-The_Validation_Report.pptx
+++ b/Slides/Slides-05-The_Validation_Report/Slides-05-The_Validation_Report.pptx
@@ -161,10 +161,25 @@
   <pc:docChgLst>
     <pc:chgData name="Ellis Hughes" userId="70958ad1-f5a5-48f5-9815-bf834be6566e" providerId="ADAL" clId="{FCD59011-65C0-4350-A482-3316DD12141E}"/>
     <pc:docChg chg="undo custSel addSld delSld modSld sldOrd">
-      <pc:chgData name="Ellis Hughes" userId="70958ad1-f5a5-48f5-9815-bf834be6566e" providerId="ADAL" clId="{FCD59011-65C0-4350-A482-3316DD12141E}" dt="2021-10-28T17:53:05.812" v="598" actId="1076"/>
+      <pc:chgData name="Ellis Hughes" userId="70958ad1-f5a5-48f5-9815-bf834be6566e" providerId="ADAL" clId="{FCD59011-65C0-4350-A482-3316DD12141E}" dt="2021-11-01T14:34:55.895" v="607" actId="27636"/>
       <pc:docMkLst>
         <pc:docMk/>
       </pc:docMkLst>
+      <pc:sldChg chg="modSp mod">
+        <pc:chgData name="Ellis Hughes" userId="70958ad1-f5a5-48f5-9815-bf834be6566e" providerId="ADAL" clId="{FCD59011-65C0-4350-A482-3316DD12141E}" dt="2021-11-01T14:34:55.895" v="607" actId="27636"/>
+        <pc:sldMkLst>
+          <pc:docMk/>
+          <pc:sldMk cId="2584280759" sldId="257"/>
+        </pc:sldMkLst>
+        <pc:spChg chg="mod">
+          <ac:chgData name="Ellis Hughes" userId="70958ad1-f5a5-48f5-9815-bf834be6566e" providerId="ADAL" clId="{FCD59011-65C0-4350-A482-3316DD12141E}" dt="2021-11-01T14:34:55.895" v="607" actId="27636"/>
+          <ac:spMkLst>
+            <pc:docMk/>
+            <pc:sldMk cId="2584280759" sldId="257"/>
+            <ac:spMk id="3" creationId="{C8722DDC-8EEE-4A06-8DFE-B44871EAA2CF}"/>
+          </ac:spMkLst>
+        </pc:spChg>
+      </pc:sldChg>
       <pc:sldChg chg="modSp mod">
         <pc:chgData name="Ellis Hughes" userId="70958ad1-f5a5-48f5-9815-bf834be6566e" providerId="ADAL" clId="{FCD59011-65C0-4350-A482-3316DD12141E}" dt="2021-10-28T17:41:46.369" v="444" actId="20577"/>
         <pc:sldMkLst>
@@ -14228,7 +14243,7 @@
           <a:p>
             <a:fld id="{AE1375EF-7AC2-40F0-8984-3657FAAC21B8}" type="datetimeFigureOut">
               <a:rPr lang="en-US" smtClean="0"/>
-              <a:t>10/28/2021</a:t>
+              <a:t>11/1/2021</a:t>
             </a:fld>
             <a:endParaRPr lang="en-US"/>
           </a:p>
@@ -16642,7 +16657,7 @@
           <a:p>
             <a:fld id="{EA0C0817-A112-4847-8014-A94B7D2A4EA3}" type="datetime1">
               <a:rPr lang="en-US" smtClean="0"/>
-              <a:t>10/28/2021</a:t>
+              <a:t>11/1/2021</a:t>
             </a:fld>
             <a:endParaRPr lang="en-US" dirty="0"/>
           </a:p>
@@ -16844,7 +16859,7 @@
           <a:p>
             <a:fld id="{7332B432-ACDA-4023-A761-2BAB76577B62}" type="datetime1">
               <a:rPr lang="en-US" smtClean="0"/>
-              <a:t>10/28/2021</a:t>
+              <a:t>11/1/2021</a:t>
             </a:fld>
             <a:endParaRPr lang="en-US" dirty="0"/>
           </a:p>
@@ -17443,7 +17458,7 @@
           <a:p>
             <a:fld id="{D9C646AA-F36E-4540-911D-FFFC0A0EF24A}" type="datetime1">
               <a:rPr lang="en-US" smtClean="0"/>
-              <a:t>10/28/2021</a:t>
+              <a:t>11/1/2021</a:t>
             </a:fld>
             <a:endParaRPr lang="en-US" dirty="0"/>
           </a:p>
@@ -17763,7 +17778,7 @@
           <a:p>
             <a:fld id="{69186D26-FA5F-4637-B602-B7C2DC34CFD4}" type="datetime1">
               <a:rPr lang="en-US" smtClean="0"/>
-              <a:t>10/28/2021</a:t>
+              <a:t>11/1/2021</a:t>
             </a:fld>
             <a:endParaRPr lang="en-US" dirty="0"/>
           </a:p>
@@ -18200,7 +18215,7 @@
           <a:p>
             <a:fld id="{8A7F15D8-96D1-4781-BC50-CA8A088B2FE4}" type="datetime1">
               <a:rPr lang="en-US" smtClean="0"/>
-              <a:t>10/28/2021</a:t>
+              <a:t>11/1/2021</a:t>
             </a:fld>
             <a:endParaRPr lang="en-US" dirty="0"/>
           </a:p>
@@ -18318,7 +18333,7 @@
           <a:p>
             <a:fld id="{F9A96C99-B8F8-4528-BD05-0E16E943DC09}" type="datetime1">
               <a:rPr lang="en-US" smtClean="0"/>
-              <a:t>10/28/2021</a:t>
+              <a:t>11/1/2021</a:t>
             </a:fld>
             <a:endParaRPr lang="en-US" dirty="0"/>
           </a:p>
@@ -18413,7 +18428,7 @@
           <a:p>
             <a:fld id="{03636942-C211-4B28-8DBD-C953E00AF71B}" type="datetime1">
               <a:rPr lang="en-US" smtClean="0"/>
-              <a:t>10/28/2021</a:t>
+              <a:t>11/1/2021</a:t>
             </a:fld>
             <a:endParaRPr lang="en-US" dirty="0"/>
           </a:p>
@@ -18830,7 +18845,7 @@
           <a:p>
             <a:fld id="{7E8D12A6-918A-48BD-8CB9-CA713993B0EA}" type="datetime1">
               <a:rPr lang="en-US" smtClean="0"/>
-              <a:t>10/28/2021</a:t>
+              <a:t>11/1/2021</a:t>
             </a:fld>
             <a:endParaRPr lang="en-US" dirty="0"/>
           </a:p>
@@ -19092,7 +19107,7 @@
             <a:fld id="{E778CE86-875F-4587-BCF6-FA054AFC0D53}" type="datetime1">
               <a:rPr lang="en-US" smtClean="0"/>
               <a:pPr/>
-              <a:t>10/28/2021</a:t>
+              <a:t>11/1/2021</a:t>
             </a:fld>
             <a:endParaRPr lang="en-US" dirty="0"/>
           </a:p>
@@ -19608,7 +19623,7 @@
           <a:p>
             <a:fld id="{F6FA2B21-3FCD-4721-B95C-427943F61125}" type="datetime1">
               <a:rPr lang="en-US" smtClean="0"/>
-              <a:t>10/28/2021</a:t>
+              <a:t>11/1/2021</a:t>
             </a:fld>
             <a:endParaRPr lang="en-US" dirty="0"/>
           </a:p>
@@ -20278,7 +20293,7 @@
         </p:spPr>
         <p:txBody>
           <a:bodyPr>
-            <a:normAutofit fontScale="92500"/>
+            <a:normAutofit fontScale="92500" lnSpcReduction="20000"/>
           </a:bodyPr>
           <a:lstStyle/>
           <a:p>
@@ -20288,12 +20303,35 @@
               </a:spcAft>
             </a:pPr>
             <a:r>
-              <a:rPr lang="en-US" sz="3600" dirty="0">
+              <a:rPr lang="en-US" sz="2400" dirty="0">
                 <a:solidFill>
                   <a:schemeClr val="tx1"/>
                 </a:solidFill>
               </a:rPr>
-              <a:t>The Validation Report</a:t>
+              <a:t>The </a:t>
+            </a:r>
+          </a:p>
+          <a:p>
+            <a:pPr>
+              <a:spcAft>
+                <a:spcPts val="600"/>
+              </a:spcAft>
+            </a:pPr>
+            <a:r>
+              <a:rPr lang="en-US" sz="2300" dirty="0">
+                <a:solidFill>
+                  <a:schemeClr val="tx1"/>
+                </a:solidFill>
+              </a:rPr>
+              <a:t>Validation</a:t>
+            </a:r>
+            <a:r>
+              <a:rPr lang="en-US" sz="2400" dirty="0">
+                <a:solidFill>
+                  <a:schemeClr val="tx1"/>
+                </a:solidFill>
+              </a:rPr>
+              <a:t> Report</a:t>
             </a:r>
           </a:p>
         </p:txBody>
@@ -22796,12 +22834,12 @@
 </file>
 
 <file path=customXml/item1.xml><?xml version="1.0" encoding="utf-8"?>
-<p:properties xmlns:p="http://schemas.microsoft.com/office/2006/metadata/properties" xmlns:xsi="http://www.w3.org/2001/XMLSchema-instance" xmlns:pc="http://schemas.microsoft.com/office/infopath/2007/PartnerControls">
-  <documentManagement>
-    <Status xmlns="71af3243-3dd4-4a8d-8c0d-dd76da1f02a5">Not started</Status>
-    <MediaServiceKeyPoints xmlns="71af3243-3dd4-4a8d-8c0d-dd76da1f02a5" xsi:nil="true"/>
-  </documentManagement>
-</p:properties>
+<?mso-contentType ?>
+<FormTemplates xmlns="http://schemas.microsoft.com/sharepoint/v3/contenttype/forms">
+  <Display>DocumentLibraryForm</Display>
+  <Edit>DocumentLibraryForm</Edit>
+  <New>DocumentLibraryForm</New>
+</FormTemplates>
 </file>
 
 <file path=customXml/item2.xml><?xml version="1.0" encoding="utf-8"?>
@@ -23026,27 +23064,18 @@
 </file>
 
 <file path=customXml/item3.xml><?xml version="1.0" encoding="utf-8"?>
-<?mso-contentType ?>
-<FormTemplates xmlns="http://schemas.microsoft.com/sharepoint/v3/contenttype/forms">
-  <Display>DocumentLibraryForm</Display>
-  <Edit>DocumentLibraryForm</Edit>
-  <New>DocumentLibraryForm</New>
-</FormTemplates>
+<p:properties xmlns:p="http://schemas.microsoft.com/office/2006/metadata/properties" xmlns:xsi="http://www.w3.org/2001/XMLSchema-instance" xmlns:pc="http://schemas.microsoft.com/office/infopath/2007/PartnerControls">
+  <documentManagement>
+    <Status xmlns="71af3243-3dd4-4a8d-8c0d-dd76da1f02a5">Not started</Status>
+    <MediaServiceKeyPoints xmlns="71af3243-3dd4-4a8d-8c0d-dd76da1f02a5" xsi:nil="true"/>
+  </documentManagement>
+</p:properties>
 </file>
 
 <file path=customXml/itemProps1.xml><?xml version="1.0" encoding="utf-8"?>
-<ds:datastoreItem xmlns:ds="http://schemas.openxmlformats.org/officeDocument/2006/customXml" ds:itemID="{137651BA-F45C-4845-9AB3-E0A65B39F5E1}">
+<ds:datastoreItem xmlns:ds="http://schemas.openxmlformats.org/officeDocument/2006/customXml" ds:itemID="{CDB58277-F8DF-46FF-84EC-EF41B835E69F}">
   <ds:schemaRefs>
-    <ds:schemaRef ds:uri="http://schemas.microsoft.com/office/2006/documentManagement/types"/>
-    <ds:schemaRef ds:uri="http://schemas.microsoft.com/office/2006/metadata/properties"/>
-    <ds:schemaRef ds:uri="http://purl.org/dc/elements/1.1/"/>
-    <ds:schemaRef ds:uri="http://purl.org/dc/terms/"/>
-    <ds:schemaRef ds:uri="http://schemas.openxmlformats.org/package/2006/metadata/core-properties"/>
-    <ds:schemaRef ds:uri="16c05727-aa75-4e4a-9b5f-8a80a1165891"/>
-    <ds:schemaRef ds:uri="http://purl.org/dc/dcmitype/"/>
-    <ds:schemaRef ds:uri="http://schemas.microsoft.com/office/infopath/2007/PartnerControls"/>
-    <ds:schemaRef ds:uri="71af3243-3dd4-4a8d-8c0d-dd76da1f02a5"/>
-    <ds:schemaRef ds:uri="http://www.w3.org/XML/1998/namespace"/>
+    <ds:schemaRef ds:uri="http://schemas.microsoft.com/sharepoint/v3/contenttype/forms"/>
   </ds:schemaRefs>
 </ds:datastoreItem>
 </file>
@@ -23071,9 +23100,18 @@
 </file>
 
 <file path=customXml/itemProps3.xml><?xml version="1.0" encoding="utf-8"?>
-<ds:datastoreItem xmlns:ds="http://schemas.openxmlformats.org/officeDocument/2006/customXml" ds:itemID="{CDB58277-F8DF-46FF-84EC-EF41B835E69F}">
+<ds:datastoreItem xmlns:ds="http://schemas.openxmlformats.org/officeDocument/2006/customXml" ds:itemID="{137651BA-F45C-4845-9AB3-E0A65B39F5E1}">
   <ds:schemaRefs>
-    <ds:schemaRef ds:uri="http://schemas.microsoft.com/sharepoint/v3/contenttype/forms"/>
+    <ds:schemaRef ds:uri="http://schemas.microsoft.com/office/2006/documentManagement/types"/>
+    <ds:schemaRef ds:uri="http://schemas.microsoft.com/office/2006/metadata/properties"/>
+    <ds:schemaRef ds:uri="http://purl.org/dc/elements/1.1/"/>
+    <ds:schemaRef ds:uri="http://purl.org/dc/terms/"/>
+    <ds:schemaRef ds:uri="http://schemas.openxmlformats.org/package/2006/metadata/core-properties"/>
+    <ds:schemaRef ds:uri="16c05727-aa75-4e4a-9b5f-8a80a1165891"/>
+    <ds:schemaRef ds:uri="http://purl.org/dc/dcmitype/"/>
+    <ds:schemaRef ds:uri="http://schemas.microsoft.com/office/infopath/2007/PartnerControls"/>
+    <ds:schemaRef ds:uri="71af3243-3dd4-4a8d-8c0d-dd76da1f02a5"/>
+    <ds:schemaRef ds:uri="http://www.w3.org/XML/1998/namespace"/>
   </ds:schemaRefs>
 </ds:datastoreItem>
 </file>
</xml_diff>